<commit_message>
adding rest proyect and unit test
</commit_message>
<xml_diff>
--- a/proyectoppt.pptx
+++ b/proyectoppt.pptx
@@ -7720,8 +7720,30 @@
           <a:p>
             <a:r>
               <a:rPr lang="es-ES" dirty="0" smtClean="0"/>
-              <a:t>Se a aplicado el principio de Reusabilidad y Alto acoplamiento ( Consultas)</a:t>
-            </a:r>
+              <a:t>Se a aplicado el principio de Reusabilidad y Alto acoplamiento ( Consultas</a:t>
+            </a:r>
+            <a:r>
+              <a:rPr lang="es-ES" dirty="0" smtClean="0"/>
+              <a:t>)</a:t>
+            </a:r>
+          </a:p>
+          <a:p>
+            <a:endParaRPr lang="es-ES" dirty="0"/>
+          </a:p>
+          <a:p>
+            <a:r>
+              <a:rPr lang="es-ES" dirty="0" smtClean="0"/>
+              <a:t>Se han implementado tecnología Java, MONGO BD, </a:t>
+            </a:r>
+            <a:r>
+              <a:rPr lang="es-ES" dirty="0" err="1" smtClean="0"/>
+              <a:t>Github</a:t>
+            </a:r>
+            <a:r>
+              <a:rPr lang="es-ES" dirty="0" smtClean="0"/>
+              <a:t> (repositorio)</a:t>
+            </a:r>
+            <a:endParaRPr lang="es-ES" dirty="0" smtClean="0"/>
           </a:p>
           <a:p>
             <a:endParaRPr lang="es-ES" dirty="0"/>

</xml_diff>